<commit_message>
untracked changes from previous laptop; testing
</commit_message>
<xml_diff>
--- a/CS383/honours/presentation.pptx
+++ b/CS383/honours/presentation.pptx
@@ -166,7 +166,7 @@
           <a:noFill/>
           <a:extLst>
             <a:ext uri="{909E8E84-426E-40dd-AFC4-6F175D3DCCD1}">
-              <a14:hiddenFill xmlns="" xmlns:a14="http://schemas.microsoft.com/office/drawing/2010/main">
+              <a14:hiddenFill xmlns:a14="http://schemas.microsoft.com/office/drawing/2010/main" xmlns="">
                 <a:solidFill>
                   <a:srgbClr val="FFFFFF"/>
                 </a:solidFill>
@@ -226,7 +226,7 @@
             </a:ln>
             <a:extLst>
               <a:ext uri="{91240B29-F687-4f45-9708-019B960494DF}">
-                <a14:hiddenLine xmlns="" xmlns:a14="http://schemas.microsoft.com/office/drawing/2010/main" w="9525">
+                <a14:hiddenLine xmlns:a14="http://schemas.microsoft.com/office/drawing/2010/main" xmlns="" w="9525">
                   <a:solidFill>
                     <a:srgbClr val="000000"/>
                   </a:solidFill>
@@ -316,7 +316,7 @@
             </a:ln>
             <a:extLst>
               <a:ext uri="{91240B29-F687-4f45-9708-019B960494DF}">
-                <a14:hiddenLine xmlns="" xmlns:a14="http://schemas.microsoft.com/office/drawing/2010/main" w="9525">
+                <a14:hiddenLine xmlns:a14="http://schemas.microsoft.com/office/drawing/2010/main" xmlns="" w="9525">
                   <a:solidFill>
                     <a:srgbClr val="000000"/>
                   </a:solidFill>
@@ -406,7 +406,7 @@
             </a:ln>
             <a:extLst>
               <a:ext uri="{91240B29-F687-4f45-9708-019B960494DF}">
-                <a14:hiddenLine xmlns="" xmlns:a14="http://schemas.microsoft.com/office/drawing/2010/main" w="9525">
+                <a14:hiddenLine xmlns:a14="http://schemas.microsoft.com/office/drawing/2010/main" xmlns="" w="9525">
                   <a:solidFill>
                     <a:srgbClr val="000000"/>
                   </a:solidFill>
@@ -440,7 +440,7 @@
             </a:ln>
             <a:extLst>
               <a:ext uri="{91240B29-F687-4f45-9708-019B960494DF}">
-                <a14:hiddenLine xmlns="" xmlns:a14="http://schemas.microsoft.com/office/drawing/2010/main" w="9525">
+                <a14:hiddenLine xmlns:a14="http://schemas.microsoft.com/office/drawing/2010/main" xmlns="" w="9525">
                   <a:solidFill>
                     <a:srgbClr val="000000"/>
                   </a:solidFill>
@@ -530,7 +530,7 @@
             </a:ln>
             <a:extLst>
               <a:ext uri="{91240B29-F687-4f45-9708-019B960494DF}">
-                <a14:hiddenLine xmlns="" xmlns:a14="http://schemas.microsoft.com/office/drawing/2010/main" w="9525">
+                <a14:hiddenLine xmlns:a14="http://schemas.microsoft.com/office/drawing/2010/main" xmlns="" w="9525">
                   <a:solidFill>
                     <a:srgbClr val="000000"/>
                   </a:solidFill>
@@ -592,7 +592,7 @@
             </a:ln>
             <a:extLst>
               <a:ext uri="{91240B29-F687-4f45-9708-019B960494DF}">
-                <a14:hiddenLine xmlns="" xmlns:a14="http://schemas.microsoft.com/office/drawing/2010/main" w="9525">
+                <a14:hiddenLine xmlns:a14="http://schemas.microsoft.com/office/drawing/2010/main" xmlns="" w="9525">
                   <a:solidFill>
                     <a:srgbClr val="000000"/>
                   </a:solidFill>
@@ -654,7 +654,7 @@
             </a:ln>
             <a:extLst>
               <a:ext uri="{91240B29-F687-4f45-9708-019B960494DF}">
-                <a14:hiddenLine xmlns="" xmlns:a14="http://schemas.microsoft.com/office/drawing/2010/main" w="9525">
+                <a14:hiddenLine xmlns:a14="http://schemas.microsoft.com/office/drawing/2010/main" xmlns="" w="9525">
                   <a:solidFill>
                     <a:srgbClr val="000000"/>
                   </a:solidFill>
@@ -744,7 +744,7 @@
             </a:ln>
             <a:extLst>
               <a:ext uri="{91240B29-F687-4f45-9708-019B960494DF}">
-                <a14:hiddenLine xmlns="" xmlns:a14="http://schemas.microsoft.com/office/drawing/2010/main" w="9525">
+                <a14:hiddenLine xmlns:a14="http://schemas.microsoft.com/office/drawing/2010/main" xmlns="" w="9525">
                   <a:solidFill>
                     <a:srgbClr val="000000"/>
                   </a:solidFill>
@@ -806,7 +806,7 @@
             </a:ln>
             <a:extLst>
               <a:ext uri="{91240B29-F687-4f45-9708-019B960494DF}">
-                <a14:hiddenLine xmlns="" xmlns:a14="http://schemas.microsoft.com/office/drawing/2010/main" w="9525">
+                <a14:hiddenLine xmlns:a14="http://schemas.microsoft.com/office/drawing/2010/main" xmlns="" w="9525">
                   <a:solidFill>
                     <a:srgbClr val="000000"/>
                   </a:solidFill>
@@ -868,7 +868,7 @@
             </a:ln>
             <a:extLst>
               <a:ext uri="{91240B29-F687-4f45-9708-019B960494DF}">
-                <a14:hiddenLine xmlns="" xmlns:a14="http://schemas.microsoft.com/office/drawing/2010/main" w="9525">
+                <a14:hiddenLine xmlns:a14="http://schemas.microsoft.com/office/drawing/2010/main" xmlns="" w="9525">
                   <a:solidFill>
                     <a:srgbClr val="000000"/>
                   </a:solidFill>
@@ -958,7 +958,7 @@
             </a:ln>
             <a:extLst>
               <a:ext uri="{91240B29-F687-4f45-9708-019B960494DF}">
-                <a14:hiddenLine xmlns="" xmlns:a14="http://schemas.microsoft.com/office/drawing/2010/main" w="9525">
+                <a14:hiddenLine xmlns:a14="http://schemas.microsoft.com/office/drawing/2010/main" xmlns="" w="9525">
                   <a:solidFill>
                     <a:srgbClr val="000000"/>
                   </a:solidFill>
@@ -1048,7 +1048,7 @@
             </a:ln>
             <a:extLst>
               <a:ext uri="{91240B29-F687-4f45-9708-019B960494DF}">
-                <a14:hiddenLine xmlns="" xmlns:a14="http://schemas.microsoft.com/office/drawing/2010/main" w="9525">
+                <a14:hiddenLine xmlns:a14="http://schemas.microsoft.com/office/drawing/2010/main" xmlns="" w="9525">
                   <a:solidFill>
                     <a:srgbClr val="000000"/>
                   </a:solidFill>
@@ -1110,7 +1110,7 @@
             </a:ln>
             <a:extLst>
               <a:ext uri="{91240B29-F687-4f45-9708-019B960494DF}">
-                <a14:hiddenLine xmlns="" xmlns:a14="http://schemas.microsoft.com/office/drawing/2010/main" w="9525">
+                <a14:hiddenLine xmlns:a14="http://schemas.microsoft.com/office/drawing/2010/main" xmlns="" w="9525">
                   <a:solidFill>
                     <a:srgbClr val="000000"/>
                   </a:solidFill>
@@ -1220,7 +1220,7 @@
             </a:ln>
             <a:extLst>
               <a:ext uri="{91240B29-F687-4f45-9708-019B960494DF}">
-                <a14:hiddenLine xmlns="" xmlns:a14="http://schemas.microsoft.com/office/drawing/2010/main" w="9525">
+                <a14:hiddenLine xmlns:a14="http://schemas.microsoft.com/office/drawing/2010/main" xmlns="" w="9525">
                   <a:solidFill>
                     <a:srgbClr val="000000"/>
                   </a:solidFill>
@@ -1282,7 +1282,7 @@
             </a:ln>
             <a:extLst>
               <a:ext uri="{91240B29-F687-4f45-9708-019B960494DF}">
-                <a14:hiddenLine xmlns="" xmlns:a14="http://schemas.microsoft.com/office/drawing/2010/main" w="9525">
+                <a14:hiddenLine xmlns:a14="http://schemas.microsoft.com/office/drawing/2010/main" xmlns="" w="9525">
                   <a:solidFill>
                     <a:srgbClr val="000000"/>
                   </a:solidFill>
@@ -1372,7 +1372,7 @@
             </a:ln>
             <a:extLst>
               <a:ext uri="{91240B29-F687-4f45-9708-019B960494DF}">
-                <a14:hiddenLine xmlns="" xmlns:a14="http://schemas.microsoft.com/office/drawing/2010/main" w="9525">
+                <a14:hiddenLine xmlns:a14="http://schemas.microsoft.com/office/drawing/2010/main" xmlns="" w="9525">
                   <a:solidFill>
                     <a:srgbClr val="000000"/>
                   </a:solidFill>
@@ -1462,7 +1462,7 @@
             </a:ln>
             <a:extLst>
               <a:ext uri="{91240B29-F687-4f45-9708-019B960494DF}">
-                <a14:hiddenLine xmlns="" xmlns:a14="http://schemas.microsoft.com/office/drawing/2010/main" w="9525">
+                <a14:hiddenLine xmlns:a14="http://schemas.microsoft.com/office/drawing/2010/main" xmlns="" w="9525">
                   <a:solidFill>
                     <a:srgbClr val="000000"/>
                   </a:solidFill>
@@ -1524,7 +1524,7 @@
             </a:ln>
             <a:extLst>
               <a:ext uri="{91240B29-F687-4f45-9708-019B960494DF}">
-                <a14:hiddenLine xmlns="" xmlns:a14="http://schemas.microsoft.com/office/drawing/2010/main" w="9525">
+                <a14:hiddenLine xmlns:a14="http://schemas.microsoft.com/office/drawing/2010/main" xmlns="" w="9525">
                   <a:solidFill>
                     <a:srgbClr val="000000"/>
                   </a:solidFill>
@@ -1614,7 +1614,7 @@
             </a:ln>
             <a:extLst>
               <a:ext uri="{91240B29-F687-4f45-9708-019B960494DF}">
-                <a14:hiddenLine xmlns="" xmlns:a14="http://schemas.microsoft.com/office/drawing/2010/main" w="9525">
+                <a14:hiddenLine xmlns:a14="http://schemas.microsoft.com/office/drawing/2010/main" xmlns="" w="9525">
                   <a:solidFill>
                     <a:srgbClr val="000000"/>
                   </a:solidFill>
@@ -1704,7 +1704,7 @@
             </a:ln>
             <a:extLst>
               <a:ext uri="{91240B29-F687-4f45-9708-019B960494DF}">
-                <a14:hiddenLine xmlns="" xmlns:a14="http://schemas.microsoft.com/office/drawing/2010/main" w="9525">
+                <a14:hiddenLine xmlns:a14="http://schemas.microsoft.com/office/drawing/2010/main" xmlns="" w="9525">
                   <a:solidFill>
                     <a:srgbClr val="000000"/>
                   </a:solidFill>
@@ -1760,7 +1760,7 @@
             </a:ln>
             <a:extLst>
               <a:ext uri="{91240B29-F687-4f45-9708-019B960494DF}">
-                <a14:hiddenLine xmlns="" xmlns:a14="http://schemas.microsoft.com/office/drawing/2010/main" w="9525">
+                <a14:hiddenLine xmlns:a14="http://schemas.microsoft.com/office/drawing/2010/main" xmlns="" w="9525">
                   <a:solidFill>
                     <a:srgbClr val="000000"/>
                   </a:solidFill>
@@ -1850,7 +1850,7 @@
             </a:ln>
             <a:extLst>
               <a:ext uri="{91240B29-F687-4f45-9708-019B960494DF}">
-                <a14:hiddenLine xmlns="" xmlns:a14="http://schemas.microsoft.com/office/drawing/2010/main" w="9525">
+                <a14:hiddenLine xmlns:a14="http://schemas.microsoft.com/office/drawing/2010/main" xmlns="" w="9525">
                   <a:solidFill>
                     <a:srgbClr val="000000"/>
                   </a:solidFill>
@@ -1906,7 +1906,7 @@
             </a:ln>
             <a:extLst>
               <a:ext uri="{91240B29-F687-4f45-9708-019B960494DF}">
-                <a14:hiddenLine xmlns="" xmlns:a14="http://schemas.microsoft.com/office/drawing/2010/main" w="9525">
+                <a14:hiddenLine xmlns:a14="http://schemas.microsoft.com/office/drawing/2010/main" xmlns="" w="9525">
                   <a:solidFill>
                     <a:srgbClr val="000000"/>
                   </a:solidFill>
@@ -1996,7 +1996,7 @@
             </a:ln>
             <a:extLst>
               <a:ext uri="{91240B29-F687-4f45-9708-019B960494DF}">
-                <a14:hiddenLine xmlns="" xmlns:a14="http://schemas.microsoft.com/office/drawing/2010/main" w="9525">
+                <a14:hiddenLine xmlns:a14="http://schemas.microsoft.com/office/drawing/2010/main" xmlns="" w="9525">
                   <a:solidFill>
                     <a:srgbClr val="000000"/>
                   </a:solidFill>
@@ -2064,7 +2064,7 @@
             </a:ln>
             <a:extLst>
               <a:ext uri="{91240B29-F687-4f45-9708-019B960494DF}">
-                <a14:hiddenLine xmlns="" xmlns:a14="http://schemas.microsoft.com/office/drawing/2010/main" w="9525">
+                <a14:hiddenLine xmlns:a14="http://schemas.microsoft.com/office/drawing/2010/main" xmlns="" w="9525">
                   <a:solidFill>
                     <a:srgbClr val="000000"/>
                   </a:solidFill>
@@ -2154,7 +2154,7 @@
             </a:ln>
             <a:extLst>
               <a:ext uri="{91240B29-F687-4f45-9708-019B960494DF}">
-                <a14:hiddenLine xmlns="" xmlns:a14="http://schemas.microsoft.com/office/drawing/2010/main" w="9525">
+                <a14:hiddenLine xmlns:a14="http://schemas.microsoft.com/office/drawing/2010/main" xmlns="" w="9525">
                   <a:solidFill>
                     <a:srgbClr val="000000"/>
                   </a:solidFill>
@@ -2222,7 +2222,7 @@
             </a:ln>
             <a:extLst>
               <a:ext uri="{91240B29-F687-4f45-9708-019B960494DF}">
-                <a14:hiddenLine xmlns="" xmlns:a14="http://schemas.microsoft.com/office/drawing/2010/main" w="9525">
+                <a14:hiddenLine xmlns:a14="http://schemas.microsoft.com/office/drawing/2010/main" xmlns="" w="9525">
                   <a:solidFill>
                     <a:srgbClr val="000000"/>
                   </a:solidFill>
@@ -2312,7 +2312,7 @@
             </a:ln>
             <a:extLst>
               <a:ext uri="{91240B29-F687-4f45-9708-019B960494DF}">
-                <a14:hiddenLine xmlns="" xmlns:a14="http://schemas.microsoft.com/office/drawing/2010/main" w="9525">
+                <a14:hiddenLine xmlns:a14="http://schemas.microsoft.com/office/drawing/2010/main" xmlns="" w="9525">
                   <a:solidFill>
                     <a:srgbClr val="000000"/>
                   </a:solidFill>
@@ -2346,7 +2346,7 @@
             </a:ln>
             <a:extLst>
               <a:ext uri="{91240B29-F687-4f45-9708-019B960494DF}">
-                <a14:hiddenLine xmlns="" xmlns:a14="http://schemas.microsoft.com/office/drawing/2010/main" w="9525">
+                <a14:hiddenLine xmlns:a14="http://schemas.microsoft.com/office/drawing/2010/main" xmlns="" w="9525">
                   <a:solidFill>
                     <a:srgbClr val="000000"/>
                   </a:solidFill>
@@ -2436,7 +2436,7 @@
             </a:ln>
             <a:extLst>
               <a:ext uri="{91240B29-F687-4f45-9708-019B960494DF}">
-                <a14:hiddenLine xmlns="" xmlns:a14="http://schemas.microsoft.com/office/drawing/2010/main" w="9525">
+                <a14:hiddenLine xmlns:a14="http://schemas.microsoft.com/office/drawing/2010/main" xmlns="" w="9525">
                   <a:solidFill>
                     <a:srgbClr val="000000"/>
                   </a:solidFill>
@@ -2498,7 +2498,7 @@
             </a:ln>
             <a:extLst>
               <a:ext uri="{91240B29-F687-4f45-9708-019B960494DF}">
-                <a14:hiddenLine xmlns="" xmlns:a14="http://schemas.microsoft.com/office/drawing/2010/main" w="9525">
+                <a14:hiddenLine xmlns:a14="http://schemas.microsoft.com/office/drawing/2010/main" xmlns="" w="9525">
                   <a:solidFill>
                     <a:srgbClr val="000000"/>
                   </a:solidFill>
@@ -2560,7 +2560,7 @@
             </a:ln>
             <a:extLst>
               <a:ext uri="{91240B29-F687-4f45-9708-019B960494DF}">
-                <a14:hiddenLine xmlns="" xmlns:a14="http://schemas.microsoft.com/office/drawing/2010/main" w="9525">
+                <a14:hiddenLine xmlns:a14="http://schemas.microsoft.com/office/drawing/2010/main" xmlns="" w="9525">
                   <a:solidFill>
                     <a:srgbClr val="000000"/>
                   </a:solidFill>
@@ -2650,7 +2650,7 @@
             </a:ln>
             <a:extLst>
               <a:ext uri="{91240B29-F687-4f45-9708-019B960494DF}">
-                <a14:hiddenLine xmlns="" xmlns:a14="http://schemas.microsoft.com/office/drawing/2010/main" w="9525">
+                <a14:hiddenLine xmlns:a14="http://schemas.microsoft.com/office/drawing/2010/main" xmlns="" w="9525">
                   <a:solidFill>
                     <a:srgbClr val="000000"/>
                   </a:solidFill>
@@ -2718,7 +2718,7 @@
             </a:ln>
             <a:extLst>
               <a:ext uri="{91240B29-F687-4f45-9708-019B960494DF}">
-                <a14:hiddenLine xmlns="" xmlns:a14="http://schemas.microsoft.com/office/drawing/2010/main" w="9525">
+                <a14:hiddenLine xmlns:a14="http://schemas.microsoft.com/office/drawing/2010/main" xmlns="" w="9525">
                   <a:solidFill>
                     <a:srgbClr val="000000"/>
                   </a:solidFill>
@@ -2780,7 +2780,7 @@
             </a:ln>
             <a:extLst>
               <a:ext uri="{91240B29-F687-4f45-9708-019B960494DF}">
-                <a14:hiddenLine xmlns="" xmlns:a14="http://schemas.microsoft.com/office/drawing/2010/main" w="9525">
+                <a14:hiddenLine xmlns:a14="http://schemas.microsoft.com/office/drawing/2010/main" xmlns="" w="9525">
                   <a:solidFill>
                     <a:srgbClr val="000000"/>
                   </a:solidFill>
@@ -2870,7 +2870,7 @@
             </a:ln>
             <a:extLst>
               <a:ext uri="{91240B29-F687-4f45-9708-019B960494DF}">
-                <a14:hiddenLine xmlns="" xmlns:a14="http://schemas.microsoft.com/office/drawing/2010/main" w="9525">
+                <a14:hiddenLine xmlns:a14="http://schemas.microsoft.com/office/drawing/2010/main" xmlns="" w="9525">
                   <a:solidFill>
                     <a:srgbClr val="000000"/>
                   </a:solidFill>
@@ -2932,7 +2932,7 @@
             </a:ln>
             <a:extLst>
               <a:ext uri="{91240B29-F687-4f45-9708-019B960494DF}">
-                <a14:hiddenLine xmlns="" xmlns:a14="http://schemas.microsoft.com/office/drawing/2010/main" w="9525">
+                <a14:hiddenLine xmlns:a14="http://schemas.microsoft.com/office/drawing/2010/main" xmlns="" w="9525">
                   <a:solidFill>
                     <a:srgbClr val="000000"/>
                   </a:solidFill>
@@ -3022,7 +3022,7 @@
             </a:ln>
             <a:extLst>
               <a:ext uri="{91240B29-F687-4f45-9708-019B960494DF}">
-                <a14:hiddenLine xmlns="" xmlns:a14="http://schemas.microsoft.com/office/drawing/2010/main" w="9525">
+                <a14:hiddenLine xmlns:a14="http://schemas.microsoft.com/office/drawing/2010/main" xmlns="" w="9525">
                   <a:solidFill>
                     <a:srgbClr val="000000"/>
                   </a:solidFill>
@@ -3084,7 +3084,7 @@
             </a:ln>
             <a:extLst>
               <a:ext uri="{91240B29-F687-4f45-9708-019B960494DF}">
-                <a14:hiddenLine xmlns="" xmlns:a14="http://schemas.microsoft.com/office/drawing/2010/main" w="9525">
+                <a14:hiddenLine xmlns:a14="http://schemas.microsoft.com/office/drawing/2010/main" xmlns="" w="9525">
                   <a:solidFill>
                     <a:srgbClr val="000000"/>
                   </a:solidFill>
@@ -3174,7 +3174,7 @@
             </a:ln>
             <a:extLst>
               <a:ext uri="{91240B29-F687-4f45-9708-019B960494DF}">
-                <a14:hiddenLine xmlns="" xmlns:a14="http://schemas.microsoft.com/office/drawing/2010/main" w="9525">
+                <a14:hiddenLine xmlns:a14="http://schemas.microsoft.com/office/drawing/2010/main" xmlns="" w="9525">
                   <a:solidFill>
                     <a:srgbClr val="000000"/>
                   </a:solidFill>
@@ -3208,7 +3208,7 @@
             </a:ln>
             <a:extLst>
               <a:ext uri="{91240B29-F687-4f45-9708-019B960494DF}">
-                <a14:hiddenLine xmlns="" xmlns:a14="http://schemas.microsoft.com/office/drawing/2010/main" w="9525">
+                <a14:hiddenLine xmlns:a14="http://schemas.microsoft.com/office/drawing/2010/main" xmlns="" w="9525">
                   <a:solidFill>
                     <a:srgbClr val="000000"/>
                   </a:solidFill>
@@ -3273,7 +3273,7 @@
             </a:ln>
             <a:extLst>
               <a:ext uri="{91240B29-F687-4f45-9708-019B960494DF}">
-                <a14:hiddenLine xmlns="" xmlns:a14="http://schemas.microsoft.com/office/drawing/2010/main" w="9525">
+                <a14:hiddenLine xmlns:a14="http://schemas.microsoft.com/office/drawing/2010/main" xmlns="" w="9525">
                   <a:solidFill>
                     <a:srgbClr val="000000"/>
                   </a:solidFill>
@@ -3363,7 +3363,7 @@
             </a:ln>
             <a:extLst>
               <a:ext uri="{91240B29-F687-4f45-9708-019B960494DF}">
-                <a14:hiddenLine xmlns="" xmlns:a14="http://schemas.microsoft.com/office/drawing/2010/main" w="9525">
+                <a14:hiddenLine xmlns:a14="http://schemas.microsoft.com/office/drawing/2010/main" xmlns="" w="9525">
                   <a:solidFill>
                     <a:srgbClr val="000000"/>
                   </a:solidFill>
@@ -3425,7 +3425,7 @@
             </a:ln>
             <a:extLst>
               <a:ext uri="{91240B29-F687-4f45-9708-019B960494DF}">
-                <a14:hiddenLine xmlns="" xmlns:a14="http://schemas.microsoft.com/office/drawing/2010/main" w="9525">
+                <a14:hiddenLine xmlns:a14="http://schemas.microsoft.com/office/drawing/2010/main" xmlns="" w="9525">
                   <a:solidFill>
                     <a:srgbClr val="000000"/>
                   </a:solidFill>
@@ -3515,7 +3515,7 @@
             </a:ln>
             <a:extLst>
               <a:ext uri="{91240B29-F687-4f45-9708-019B960494DF}">
-                <a14:hiddenLine xmlns="" xmlns:a14="http://schemas.microsoft.com/office/drawing/2010/main" w="9525">
+                <a14:hiddenLine xmlns:a14="http://schemas.microsoft.com/office/drawing/2010/main" xmlns="" w="9525">
                   <a:solidFill>
                     <a:srgbClr val="000000"/>
                   </a:solidFill>
@@ -3605,7 +3605,7 @@
             </a:ln>
             <a:extLst>
               <a:ext uri="{91240B29-F687-4f45-9708-019B960494DF}">
-                <a14:hiddenLine xmlns="" xmlns:a14="http://schemas.microsoft.com/office/drawing/2010/main" w="9525">
+                <a14:hiddenLine xmlns:a14="http://schemas.microsoft.com/office/drawing/2010/main" xmlns="" w="9525">
                   <a:solidFill>
                     <a:srgbClr val="000000"/>
                   </a:solidFill>
@@ -3670,7 +3670,7 @@
             </a:ln>
             <a:extLst>
               <a:ext uri="{91240B29-F687-4f45-9708-019B960494DF}">
-                <a14:hiddenLine xmlns="" xmlns:a14="http://schemas.microsoft.com/office/drawing/2010/main" w="9525">
+                <a14:hiddenLine xmlns:a14="http://schemas.microsoft.com/office/drawing/2010/main" xmlns="" w="9525">
                   <a:solidFill>
                     <a:srgbClr val="000000"/>
                   </a:solidFill>
@@ -3732,7 +3732,7 @@
             </a:ln>
             <a:extLst>
               <a:ext uri="{91240B29-F687-4f45-9708-019B960494DF}">
-                <a14:hiddenLine xmlns="" xmlns:a14="http://schemas.microsoft.com/office/drawing/2010/main" w="9525">
+                <a14:hiddenLine xmlns:a14="http://schemas.microsoft.com/office/drawing/2010/main" xmlns="" w="9525">
                   <a:solidFill>
                     <a:srgbClr val="000000"/>
                   </a:solidFill>
@@ -3822,7 +3822,7 @@
             </a:ln>
             <a:extLst>
               <a:ext uri="{91240B29-F687-4f45-9708-019B960494DF}">
-                <a14:hiddenLine xmlns="" xmlns:a14="http://schemas.microsoft.com/office/drawing/2010/main" w="9525">
+                <a14:hiddenLine xmlns:a14="http://schemas.microsoft.com/office/drawing/2010/main" xmlns="" w="9525">
                   <a:solidFill>
                     <a:srgbClr val="000000"/>
                   </a:solidFill>
@@ -3912,7 +3912,7 @@
             </a:ln>
             <a:extLst>
               <a:ext uri="{91240B29-F687-4f45-9708-019B960494DF}">
-                <a14:hiddenLine xmlns="" xmlns:a14="http://schemas.microsoft.com/office/drawing/2010/main" w="9525">
+                <a14:hiddenLine xmlns:a14="http://schemas.microsoft.com/office/drawing/2010/main" xmlns="" w="9525">
                   <a:solidFill>
                     <a:srgbClr val="000000"/>
                   </a:solidFill>
@@ -3974,7 +3974,7 @@
             </a:ln>
             <a:extLst>
               <a:ext uri="{91240B29-F687-4f45-9708-019B960494DF}">
-                <a14:hiddenLine xmlns="" xmlns:a14="http://schemas.microsoft.com/office/drawing/2010/main" w="9525">
+                <a14:hiddenLine xmlns:a14="http://schemas.microsoft.com/office/drawing/2010/main" xmlns="" w="9525">
                   <a:solidFill>
                     <a:srgbClr val="000000"/>
                   </a:solidFill>
@@ -4094,7 +4094,7 @@
             </a:ln>
             <a:extLst>
               <a:ext uri="{91240B29-F687-4f45-9708-019B960494DF}">
-                <a14:hiddenLine xmlns="" xmlns:a14="http://schemas.microsoft.com/office/drawing/2010/main" w="9525">
+                <a14:hiddenLine xmlns:a14="http://schemas.microsoft.com/office/drawing/2010/main" xmlns="" w="9525">
                   <a:solidFill>
                     <a:srgbClr val="000000"/>
                   </a:solidFill>
@@ -4162,7 +4162,7 @@
             </a:ln>
             <a:extLst>
               <a:ext uri="{91240B29-F687-4f45-9708-019B960494DF}">
-                <a14:hiddenLine xmlns="" xmlns:a14="http://schemas.microsoft.com/office/drawing/2010/main" w="9525">
+                <a14:hiddenLine xmlns:a14="http://schemas.microsoft.com/office/drawing/2010/main" xmlns="" w="9525">
                   <a:solidFill>
                     <a:srgbClr val="000000"/>
                   </a:solidFill>
@@ -4252,7 +4252,7 @@
             </a:ln>
             <a:extLst>
               <a:ext uri="{91240B29-F687-4f45-9708-019B960494DF}">
-                <a14:hiddenLine xmlns="" xmlns:a14="http://schemas.microsoft.com/office/drawing/2010/main" w="9525">
+                <a14:hiddenLine xmlns:a14="http://schemas.microsoft.com/office/drawing/2010/main" xmlns="" w="9525">
                   <a:solidFill>
                     <a:srgbClr val="000000"/>
                   </a:solidFill>
@@ -4392,7 +4392,7 @@
           <a:p>
             <a:fld id="{8B6C2AFC-E312-4DF4-802C-A2004B667576}" type="datetimeFigureOut">
               <a:rPr lang="en-GB" smtClean="0"/>
-              <a:t>06/06/2020</a:t>
+              <a:t>08/06/2020</a:t>
             </a:fld>
             <a:endParaRPr lang="en-GB"/>
           </a:p>
@@ -4659,7 +4659,7 @@
           <a:p>
             <a:fld id="{8B6C2AFC-E312-4DF4-802C-A2004B667576}" type="datetimeFigureOut">
               <a:rPr lang="en-GB" smtClean="0"/>
-              <a:t>06/06/2020</a:t>
+              <a:t>08/06/2020</a:t>
             </a:fld>
             <a:endParaRPr lang="en-GB"/>
           </a:p>
@@ -4855,7 +4855,7 @@
           <a:p>
             <a:fld id="{8B6C2AFC-E312-4DF4-802C-A2004B667576}" type="datetimeFigureOut">
               <a:rPr lang="en-GB" smtClean="0"/>
-              <a:t>06/06/2020</a:t>
+              <a:t>08/06/2020</a:t>
             </a:fld>
             <a:endParaRPr lang="en-GB"/>
           </a:p>
@@ -5118,7 +5118,7 @@
           <a:p>
             <a:fld id="{8B6C2AFC-E312-4DF4-802C-A2004B667576}" type="datetimeFigureOut">
               <a:rPr lang="en-GB" smtClean="0"/>
-              <a:t>06/06/2020</a:t>
+              <a:t>08/06/2020</a:t>
             </a:fld>
             <a:endParaRPr lang="en-GB"/>
           </a:p>
@@ -5552,7 +5552,7 @@
           <a:p>
             <a:fld id="{8B6C2AFC-E312-4DF4-802C-A2004B667576}" type="datetimeFigureOut">
               <a:rPr lang="en-GB" smtClean="0"/>
-              <a:t>06/06/2020</a:t>
+              <a:t>08/06/2020</a:t>
             </a:fld>
             <a:endParaRPr lang="en-GB"/>
           </a:p>
@@ -6098,7 +6098,7 @@
           <a:p>
             <a:fld id="{8B6C2AFC-E312-4DF4-802C-A2004B667576}" type="datetimeFigureOut">
               <a:rPr lang="en-GB" smtClean="0"/>
-              <a:t>06/06/2020</a:t>
+              <a:t>08/06/2020</a:t>
             </a:fld>
             <a:endParaRPr lang="en-GB"/>
           </a:p>
@@ -6818,7 +6818,7 @@
           <a:p>
             <a:fld id="{8B6C2AFC-E312-4DF4-802C-A2004B667576}" type="datetimeFigureOut">
               <a:rPr lang="en-GB" smtClean="0"/>
-              <a:t>06/06/2020</a:t>
+              <a:t>08/06/2020</a:t>
             </a:fld>
             <a:endParaRPr lang="en-GB"/>
           </a:p>
@@ -6988,7 +6988,7 @@
           <a:p>
             <a:fld id="{8B6C2AFC-E312-4DF4-802C-A2004B667576}" type="datetimeFigureOut">
               <a:rPr lang="en-GB" smtClean="0"/>
-              <a:t>06/06/2020</a:t>
+              <a:t>08/06/2020</a:t>
             </a:fld>
             <a:endParaRPr lang="en-GB"/>
           </a:p>
@@ -7168,7 +7168,7 @@
           <a:p>
             <a:fld id="{8B6C2AFC-E312-4DF4-802C-A2004B667576}" type="datetimeFigureOut">
               <a:rPr lang="en-GB" smtClean="0"/>
-              <a:t>06/06/2020</a:t>
+              <a:t>08/06/2020</a:t>
             </a:fld>
             <a:endParaRPr lang="en-GB"/>
           </a:p>
@@ -7338,7 +7338,7 @@
           <a:p>
             <a:fld id="{8B6C2AFC-E312-4DF4-802C-A2004B667576}" type="datetimeFigureOut">
               <a:rPr lang="en-GB" smtClean="0"/>
-              <a:t>06/06/2020</a:t>
+              <a:t>08/06/2020</a:t>
             </a:fld>
             <a:endParaRPr lang="en-GB"/>
           </a:p>
@@ -7588,7 +7588,7 @@
           <a:p>
             <a:fld id="{8B6C2AFC-E312-4DF4-802C-A2004B667576}" type="datetimeFigureOut">
               <a:rPr lang="en-GB" smtClean="0"/>
-              <a:t>06/06/2020</a:t>
+              <a:t>08/06/2020</a:t>
             </a:fld>
             <a:endParaRPr lang="en-GB"/>
           </a:p>
@@ -7820,7 +7820,7 @@
           <a:p>
             <a:fld id="{8B6C2AFC-E312-4DF4-802C-A2004B667576}" type="datetimeFigureOut">
               <a:rPr lang="en-GB" smtClean="0"/>
-              <a:t>06/06/2020</a:t>
+              <a:t>08/06/2020</a:t>
             </a:fld>
             <a:endParaRPr lang="en-GB"/>
           </a:p>
@@ -8201,7 +8201,7 @@
           <a:p>
             <a:fld id="{8B6C2AFC-E312-4DF4-802C-A2004B667576}" type="datetimeFigureOut">
               <a:rPr lang="en-GB" smtClean="0"/>
-              <a:t>06/06/2020</a:t>
+              <a:t>08/06/2020</a:t>
             </a:fld>
             <a:endParaRPr lang="en-GB"/>
           </a:p>
@@ -8319,7 +8319,7 @@
           <a:p>
             <a:fld id="{8B6C2AFC-E312-4DF4-802C-A2004B667576}" type="datetimeFigureOut">
               <a:rPr lang="en-GB" smtClean="0"/>
-              <a:t>06/06/2020</a:t>
+              <a:t>08/06/2020</a:t>
             </a:fld>
             <a:endParaRPr lang="en-GB"/>
           </a:p>
@@ -8414,7 +8414,7 @@
           <a:p>
             <a:fld id="{8B6C2AFC-E312-4DF4-802C-A2004B667576}" type="datetimeFigureOut">
               <a:rPr lang="en-GB" smtClean="0"/>
-              <a:t>06/06/2020</a:t>
+              <a:t>08/06/2020</a:t>
             </a:fld>
             <a:endParaRPr lang="en-GB"/>
           </a:p>
@@ -8663,7 +8663,7 @@
           <a:p>
             <a:fld id="{8B6C2AFC-E312-4DF4-802C-A2004B667576}" type="datetimeFigureOut">
               <a:rPr lang="en-GB" smtClean="0"/>
-              <a:t>06/06/2020</a:t>
+              <a:t>08/06/2020</a:t>
             </a:fld>
             <a:endParaRPr lang="en-GB"/>
           </a:p>
@@ -8943,7 +8943,7 @@
           <a:p>
             <a:fld id="{8B6C2AFC-E312-4DF4-802C-A2004B667576}" type="datetimeFigureOut">
               <a:rPr lang="en-GB" smtClean="0"/>
-              <a:t>06/06/2020</a:t>
+              <a:t>08/06/2020</a:t>
             </a:fld>
             <a:endParaRPr lang="en-GB"/>
           </a:p>
@@ -9059,7 +9059,7 @@
           <a:noFill/>
           <a:extLst>
             <a:ext uri="{909E8E84-426E-40dd-AFC4-6F175D3DCCD1}">
-              <a14:hiddenFill xmlns="" xmlns:a14="http://schemas.microsoft.com/office/drawing/2010/main">
+              <a14:hiddenFill xmlns:a14="http://schemas.microsoft.com/office/drawing/2010/main" xmlns="">
                 <a:solidFill>
                   <a:srgbClr val="FFFFFF"/>
                 </a:solidFill>
@@ -9133,7 +9133,7 @@
               </a:ln>
               <a:extLst>
                 <a:ext uri="{91240B29-F687-4f45-9708-019B960494DF}">
-                  <a14:hiddenLine xmlns="" xmlns:a14="http://schemas.microsoft.com/office/drawing/2010/main" w="9525">
+                  <a14:hiddenLine xmlns:a14="http://schemas.microsoft.com/office/drawing/2010/main" xmlns="" w="9525">
                     <a:solidFill>
                       <a:srgbClr val="000000"/>
                     </a:solidFill>
@@ -9223,7 +9223,7 @@
               </a:ln>
               <a:extLst>
                 <a:ext uri="{91240B29-F687-4f45-9708-019B960494DF}">
-                  <a14:hiddenLine xmlns="" xmlns:a14="http://schemas.microsoft.com/office/drawing/2010/main" w="9525">
+                  <a14:hiddenLine xmlns:a14="http://schemas.microsoft.com/office/drawing/2010/main" xmlns="" w="9525">
                     <a:solidFill>
                       <a:srgbClr val="000000"/>
                     </a:solidFill>
@@ -9313,7 +9313,7 @@
               </a:ln>
               <a:extLst>
                 <a:ext uri="{91240B29-F687-4f45-9708-019B960494DF}">
-                  <a14:hiddenLine xmlns="" xmlns:a14="http://schemas.microsoft.com/office/drawing/2010/main" w="9525">
+                  <a14:hiddenLine xmlns:a14="http://schemas.microsoft.com/office/drawing/2010/main" xmlns="" w="9525">
                     <a:solidFill>
                       <a:srgbClr val="000000"/>
                     </a:solidFill>
@@ -9375,7 +9375,7 @@
               </a:ln>
               <a:extLst>
                 <a:ext uri="{91240B29-F687-4f45-9708-019B960494DF}">
-                  <a14:hiddenLine xmlns="" xmlns:a14="http://schemas.microsoft.com/office/drawing/2010/main" w="9525">
+                  <a14:hiddenLine xmlns:a14="http://schemas.microsoft.com/office/drawing/2010/main" xmlns="" w="9525">
                     <a:solidFill>
                       <a:srgbClr val="000000"/>
                     </a:solidFill>
@@ -9465,7 +9465,7 @@
               </a:ln>
               <a:extLst>
                 <a:ext uri="{91240B29-F687-4f45-9708-019B960494DF}">
-                  <a14:hiddenLine xmlns="" xmlns:a14="http://schemas.microsoft.com/office/drawing/2010/main" w="9525">
+                  <a14:hiddenLine xmlns:a14="http://schemas.microsoft.com/office/drawing/2010/main" xmlns="" w="9525">
                     <a:solidFill>
                       <a:srgbClr val="000000"/>
                     </a:solidFill>
@@ -9527,7 +9527,7 @@
               </a:ln>
               <a:extLst>
                 <a:ext uri="{91240B29-F687-4f45-9708-019B960494DF}">
-                  <a14:hiddenLine xmlns="" xmlns:a14="http://schemas.microsoft.com/office/drawing/2010/main" w="9525">
+                  <a14:hiddenLine xmlns:a14="http://schemas.microsoft.com/office/drawing/2010/main" xmlns="" w="9525">
                     <a:solidFill>
                       <a:srgbClr val="000000"/>
                     </a:solidFill>
@@ -9589,7 +9589,7 @@
               </a:ln>
               <a:extLst>
                 <a:ext uri="{91240B29-F687-4f45-9708-019B960494DF}">
-                  <a14:hiddenLine xmlns="" xmlns:a14="http://schemas.microsoft.com/office/drawing/2010/main" w="9525">
+                  <a14:hiddenLine xmlns:a14="http://schemas.microsoft.com/office/drawing/2010/main" xmlns="" w="9525">
                     <a:solidFill>
                       <a:srgbClr val="000000"/>
                     </a:solidFill>
@@ -9679,7 +9679,7 @@
               </a:ln>
               <a:extLst>
                 <a:ext uri="{91240B29-F687-4f45-9708-019B960494DF}">
-                  <a14:hiddenLine xmlns="" xmlns:a14="http://schemas.microsoft.com/office/drawing/2010/main" w="9525">
+                  <a14:hiddenLine xmlns:a14="http://schemas.microsoft.com/office/drawing/2010/main" xmlns="" w="9525">
                     <a:solidFill>
                       <a:srgbClr val="000000"/>
                     </a:solidFill>
@@ -9769,7 +9769,7 @@
               </a:ln>
               <a:extLst>
                 <a:ext uri="{91240B29-F687-4f45-9708-019B960494DF}">
-                  <a14:hiddenLine xmlns="" xmlns:a14="http://schemas.microsoft.com/office/drawing/2010/main" w="9525">
+                  <a14:hiddenLine xmlns:a14="http://schemas.microsoft.com/office/drawing/2010/main" xmlns="" w="9525">
                     <a:solidFill>
                       <a:srgbClr val="000000"/>
                     </a:solidFill>
@@ -9831,7 +9831,7 @@
               </a:ln>
               <a:extLst>
                 <a:ext uri="{91240B29-F687-4f45-9708-019B960494DF}">
-                  <a14:hiddenLine xmlns="" xmlns:a14="http://schemas.microsoft.com/office/drawing/2010/main" w="9525">
+                  <a14:hiddenLine xmlns:a14="http://schemas.microsoft.com/office/drawing/2010/main" xmlns="" w="9525">
                     <a:solidFill>
                       <a:srgbClr val="000000"/>
                     </a:solidFill>
@@ -9941,7 +9941,7 @@
               </a:ln>
               <a:extLst>
                 <a:ext uri="{91240B29-F687-4f45-9708-019B960494DF}">
-                  <a14:hiddenLine xmlns="" xmlns:a14="http://schemas.microsoft.com/office/drawing/2010/main" w="9525">
+                  <a14:hiddenLine xmlns:a14="http://schemas.microsoft.com/office/drawing/2010/main" xmlns="" w="9525">
                     <a:solidFill>
                       <a:srgbClr val="000000"/>
                     </a:solidFill>
@@ -10025,7 +10025,7 @@
               </a:ln>
               <a:extLst>
                 <a:ext uri="{91240B29-F687-4f45-9708-019B960494DF}">
-                  <a14:hiddenLine xmlns="" xmlns:a14="http://schemas.microsoft.com/office/drawing/2010/main" w="9525">
+                  <a14:hiddenLine xmlns:a14="http://schemas.microsoft.com/office/drawing/2010/main" xmlns="" w="9525">
                     <a:solidFill>
                       <a:srgbClr val="000000"/>
                     </a:solidFill>
@@ -10087,7 +10087,7 @@
               </a:ln>
               <a:extLst>
                 <a:ext uri="{91240B29-F687-4f45-9708-019B960494DF}">
-                  <a14:hiddenLine xmlns="" xmlns:a14="http://schemas.microsoft.com/office/drawing/2010/main" w="9525">
+                  <a14:hiddenLine xmlns:a14="http://schemas.microsoft.com/office/drawing/2010/main" xmlns="" w="9525">
                     <a:solidFill>
                       <a:srgbClr val="000000"/>
                     </a:solidFill>
@@ -10149,7 +10149,7 @@
               </a:ln>
               <a:extLst>
                 <a:ext uri="{91240B29-F687-4f45-9708-019B960494DF}">
-                  <a14:hiddenLine xmlns="" xmlns:a14="http://schemas.microsoft.com/office/drawing/2010/main" w="9525">
+                  <a14:hiddenLine xmlns:a14="http://schemas.microsoft.com/office/drawing/2010/main" xmlns="" w="9525">
                     <a:solidFill>
                       <a:srgbClr val="000000"/>
                     </a:solidFill>
@@ -10239,7 +10239,7 @@
               </a:ln>
               <a:extLst>
                 <a:ext uri="{91240B29-F687-4f45-9708-019B960494DF}">
-                  <a14:hiddenLine xmlns="" xmlns:a14="http://schemas.microsoft.com/office/drawing/2010/main" w="9525">
+                  <a14:hiddenLine xmlns:a14="http://schemas.microsoft.com/office/drawing/2010/main" xmlns="" w="9525">
                     <a:solidFill>
                       <a:srgbClr val="000000"/>
                     </a:solidFill>
@@ -10273,7 +10273,7 @@
               </a:ln>
               <a:extLst>
                 <a:ext uri="{91240B29-F687-4f45-9708-019B960494DF}">
-                  <a14:hiddenLine xmlns="" xmlns:a14="http://schemas.microsoft.com/office/drawing/2010/main" w="9525">
+                  <a14:hiddenLine xmlns:a14="http://schemas.microsoft.com/office/drawing/2010/main" xmlns="" w="9525">
                     <a:solidFill>
                       <a:srgbClr val="000000"/>
                     </a:solidFill>
@@ -10338,7 +10338,7 @@
               </a:ln>
               <a:extLst>
                 <a:ext uri="{91240B29-F687-4f45-9708-019B960494DF}">
-                  <a14:hiddenLine xmlns="" xmlns:a14="http://schemas.microsoft.com/office/drawing/2010/main" w="9525">
+                  <a14:hiddenLine xmlns:a14="http://schemas.microsoft.com/office/drawing/2010/main" xmlns="" w="9525">
                     <a:solidFill>
                       <a:srgbClr val="000000"/>
                     </a:solidFill>
@@ -10428,7 +10428,7 @@
               </a:ln>
               <a:extLst>
                 <a:ext uri="{91240B29-F687-4f45-9708-019B960494DF}">
-                  <a14:hiddenLine xmlns="" xmlns:a14="http://schemas.microsoft.com/office/drawing/2010/main" w="9525">
+                  <a14:hiddenLine xmlns:a14="http://schemas.microsoft.com/office/drawing/2010/main" xmlns="" w="9525">
                     <a:solidFill>
                       <a:srgbClr val="000000"/>
                     </a:solidFill>
@@ -10490,7 +10490,7 @@
               </a:ln>
               <a:extLst>
                 <a:ext uri="{91240B29-F687-4f45-9708-019B960494DF}">
-                  <a14:hiddenLine xmlns="" xmlns:a14="http://schemas.microsoft.com/office/drawing/2010/main" w="9525">
+                  <a14:hiddenLine xmlns:a14="http://schemas.microsoft.com/office/drawing/2010/main" xmlns="" w="9525">
                     <a:solidFill>
                       <a:srgbClr val="000000"/>
                     </a:solidFill>
@@ -10580,7 +10580,7 @@
               </a:ln>
               <a:extLst>
                 <a:ext uri="{91240B29-F687-4f45-9708-019B960494DF}">
-                  <a14:hiddenLine xmlns="" xmlns:a14="http://schemas.microsoft.com/office/drawing/2010/main" w="9525">
+                  <a14:hiddenLine xmlns:a14="http://schemas.microsoft.com/office/drawing/2010/main" xmlns="" w="9525">
                     <a:solidFill>
                       <a:srgbClr val="000000"/>
                     </a:solidFill>
@@ -10645,7 +10645,7 @@
               </a:ln>
               <a:extLst>
                 <a:ext uri="{91240B29-F687-4f45-9708-019B960494DF}">
-                  <a14:hiddenLine xmlns="" xmlns:a14="http://schemas.microsoft.com/office/drawing/2010/main" w="9525">
+                  <a14:hiddenLine xmlns:a14="http://schemas.microsoft.com/office/drawing/2010/main" xmlns="" w="9525">
                     <a:solidFill>
                       <a:srgbClr val="000000"/>
                     </a:solidFill>
@@ -10707,7 +10707,7 @@
               </a:ln>
               <a:extLst>
                 <a:ext uri="{91240B29-F687-4f45-9708-019B960494DF}">
-                  <a14:hiddenLine xmlns="" xmlns:a14="http://schemas.microsoft.com/office/drawing/2010/main" w="9525">
+                  <a14:hiddenLine xmlns:a14="http://schemas.microsoft.com/office/drawing/2010/main" xmlns="" w="9525">
                     <a:solidFill>
                       <a:srgbClr val="000000"/>
                     </a:solidFill>
@@ -10797,7 +10797,7 @@
               </a:ln>
               <a:extLst>
                 <a:ext uri="{91240B29-F687-4f45-9708-019B960494DF}">
-                  <a14:hiddenLine xmlns="" xmlns:a14="http://schemas.microsoft.com/office/drawing/2010/main" w="9525">
+                  <a14:hiddenLine xmlns:a14="http://schemas.microsoft.com/office/drawing/2010/main" xmlns="" w="9525">
                     <a:solidFill>
                       <a:srgbClr val="000000"/>
                     </a:solidFill>
@@ -10887,7 +10887,7 @@
               </a:ln>
               <a:extLst>
                 <a:ext uri="{91240B29-F687-4f45-9708-019B960494DF}">
-                  <a14:hiddenLine xmlns="" xmlns:a14="http://schemas.microsoft.com/office/drawing/2010/main" w="9525">
+                  <a14:hiddenLine xmlns:a14="http://schemas.microsoft.com/office/drawing/2010/main" xmlns="" w="9525">
                     <a:solidFill>
                       <a:srgbClr val="000000"/>
                     </a:solidFill>
@@ -10952,7 +10952,7 @@
               </a:ln>
               <a:extLst>
                 <a:ext uri="{91240B29-F687-4f45-9708-019B960494DF}">
-                  <a14:hiddenLine xmlns="" xmlns:a14="http://schemas.microsoft.com/office/drawing/2010/main" w="9525">
+                  <a14:hiddenLine xmlns:a14="http://schemas.microsoft.com/office/drawing/2010/main" xmlns="" w="9525">
                     <a:solidFill>
                       <a:srgbClr val="000000"/>
                     </a:solidFill>
@@ -11072,7 +11072,7 @@
               </a:ln>
               <a:extLst>
                 <a:ext uri="{91240B29-F687-4f45-9708-019B960494DF}">
-                  <a14:hiddenLine xmlns="" xmlns:a14="http://schemas.microsoft.com/office/drawing/2010/main" w="9525">
+                  <a14:hiddenLine xmlns:a14="http://schemas.microsoft.com/office/drawing/2010/main" xmlns="" w="9525">
                     <a:solidFill>
                       <a:srgbClr val="000000"/>
                     </a:solidFill>
@@ -11170,7 +11170,7 @@
               </a:ln>
               <a:extLst>
                 <a:ext uri="{91240B29-F687-4f45-9708-019B960494DF}">
-                  <a14:hiddenLine xmlns="" xmlns:a14="http://schemas.microsoft.com/office/drawing/2010/main" w="9525">
+                  <a14:hiddenLine xmlns:a14="http://schemas.microsoft.com/office/drawing/2010/main" xmlns="" w="9525">
                     <a:solidFill>
                       <a:srgbClr val="000000"/>
                     </a:solidFill>
@@ -11285,7 +11285,7 @@
               </a:ln>
               <a:extLst>
                 <a:ext uri="{91240B29-F687-4f45-9708-019B960494DF}">
-                  <a14:hiddenLine xmlns="" xmlns:a14="http://schemas.microsoft.com/office/drawing/2010/main" w="9525">
+                  <a14:hiddenLine xmlns:a14="http://schemas.microsoft.com/office/drawing/2010/main" xmlns="" w="9525">
                     <a:solidFill>
                       <a:srgbClr val="000000"/>
                     </a:solidFill>
@@ -11375,7 +11375,7 @@
               </a:ln>
               <a:extLst>
                 <a:ext uri="{91240B29-F687-4f45-9708-019B960494DF}">
-                  <a14:hiddenLine xmlns="" xmlns:a14="http://schemas.microsoft.com/office/drawing/2010/main" w="9525">
+                  <a14:hiddenLine xmlns:a14="http://schemas.microsoft.com/office/drawing/2010/main" xmlns="" w="9525">
                     <a:solidFill>
                       <a:srgbClr val="000000"/>
                     </a:solidFill>
@@ -11440,7 +11440,7 @@
               </a:ln>
               <a:extLst>
                 <a:ext uri="{91240B29-F687-4f45-9708-019B960494DF}">
-                  <a14:hiddenLine xmlns="" xmlns:a14="http://schemas.microsoft.com/office/drawing/2010/main" w="9525">
+                  <a14:hiddenLine xmlns:a14="http://schemas.microsoft.com/office/drawing/2010/main" xmlns="" w="9525">
                     <a:solidFill>
                       <a:srgbClr val="000000"/>
                     </a:solidFill>
@@ -11530,7 +11530,7 @@
               </a:ln>
               <a:extLst>
                 <a:ext uri="{91240B29-F687-4f45-9708-019B960494DF}">
-                  <a14:hiddenLine xmlns="" xmlns:a14="http://schemas.microsoft.com/office/drawing/2010/main" w="9525">
+                  <a14:hiddenLine xmlns:a14="http://schemas.microsoft.com/office/drawing/2010/main" xmlns="" w="9525">
                     <a:solidFill>
                       <a:srgbClr val="000000"/>
                     </a:solidFill>
@@ -11598,7 +11598,7 @@
               </a:ln>
               <a:extLst>
                 <a:ext uri="{91240B29-F687-4f45-9708-019B960494DF}">
-                  <a14:hiddenLine xmlns="" xmlns:a14="http://schemas.microsoft.com/office/drawing/2010/main" w="9525">
+                  <a14:hiddenLine xmlns:a14="http://schemas.microsoft.com/office/drawing/2010/main" xmlns="" w="9525">
                     <a:solidFill>
                       <a:srgbClr val="000000"/>
                     </a:solidFill>
@@ -11688,7 +11688,7 @@
               </a:ln>
               <a:extLst>
                 <a:ext uri="{91240B29-F687-4f45-9708-019B960494DF}">
-                  <a14:hiddenLine xmlns="" xmlns:a14="http://schemas.microsoft.com/office/drawing/2010/main" w="9525">
+                  <a14:hiddenLine xmlns:a14="http://schemas.microsoft.com/office/drawing/2010/main" xmlns="" w="9525">
                     <a:solidFill>
                       <a:srgbClr val="000000"/>
                     </a:solidFill>
@@ -11756,7 +11756,7 @@
               </a:ln>
               <a:extLst>
                 <a:ext uri="{91240B29-F687-4f45-9708-019B960494DF}">
-                  <a14:hiddenLine xmlns="" xmlns:a14="http://schemas.microsoft.com/office/drawing/2010/main" w="9525">
+                  <a14:hiddenLine xmlns:a14="http://schemas.microsoft.com/office/drawing/2010/main" xmlns="" w="9525">
                     <a:solidFill>
                       <a:srgbClr val="000000"/>
                     </a:solidFill>
@@ -11846,7 +11846,7 @@
               </a:ln>
               <a:extLst>
                 <a:ext uri="{91240B29-F687-4f45-9708-019B960494DF}">
-                  <a14:hiddenLine xmlns="" xmlns:a14="http://schemas.microsoft.com/office/drawing/2010/main" w="9525">
+                  <a14:hiddenLine xmlns:a14="http://schemas.microsoft.com/office/drawing/2010/main" xmlns="" w="9525">
                     <a:solidFill>
                       <a:srgbClr val="000000"/>
                     </a:solidFill>
@@ -11880,7 +11880,7 @@
               </a:ln>
               <a:extLst>
                 <a:ext uri="{91240B29-F687-4f45-9708-019B960494DF}">
-                  <a14:hiddenLine xmlns="" xmlns:a14="http://schemas.microsoft.com/office/drawing/2010/main" w="9525">
+                  <a14:hiddenLine xmlns:a14="http://schemas.microsoft.com/office/drawing/2010/main" xmlns="" w="9525">
                     <a:solidFill>
                       <a:srgbClr val="000000"/>
                     </a:solidFill>
@@ -12020,7 +12020,7 @@
           <a:p>
             <a:fld id="{8B6C2AFC-E312-4DF4-802C-A2004B667576}" type="datetimeFigureOut">
               <a:rPr lang="en-GB" smtClean="0"/>
-              <a:t>06/06/2020</a:t>
+              <a:t>08/06/2020</a:t>
             </a:fld>
             <a:endParaRPr lang="en-GB"/>
           </a:p>
@@ -12684,12 +12684,6 @@
           <a:lstStyle/>
           <a:p>
             <a:r>
-              <a:rPr lang="en-US" dirty="0"/>
-              <a:t>//Needs a separate slide, because it’s an important issue</a:t>
-            </a:r>
-          </a:p>
-          <a:p>
-            <a:r>
               <a:rPr lang="en-GB" dirty="0"/>
               <a:t>“The production of an analysis which corresponds too closely or exactly to a particular set of data, and may therefore fail to fir additional data or predict future observations reliably.”</a:t>
             </a:r>

</xml_diff>